<commit_message>
Fixed issue with with setup rows in .mat files not being removed in ext_raw_measures.py, carried out more experiments and added to results, and added several batch files.
</commit_message>
<xml_diff>
--- a/plans_and_presentations/Project Summary presentation.pptx
+++ b/plans_and_presentations/Project Summary presentation.pptx
@@ -273,7 +273,7 @@
           <a:p>
             <a:fld id="{DFFE663C-AB41-468C-AA15-165177882E1A}" type="datetimeFigureOut">
               <a:rPr lang="en-GB" smtClean="0"/>
-              <a:t>24/06/2019</a:t>
+              <a:t>03/07/2019</a:t>
             </a:fld>
             <a:endParaRPr lang="en-GB"/>
           </a:p>
@@ -473,7 +473,7 @@
           <a:p>
             <a:fld id="{DFFE663C-AB41-468C-AA15-165177882E1A}" type="datetimeFigureOut">
               <a:rPr lang="en-GB" smtClean="0"/>
-              <a:t>24/06/2019</a:t>
+              <a:t>03/07/2019</a:t>
             </a:fld>
             <a:endParaRPr lang="en-GB"/>
           </a:p>
@@ -683,7 +683,7 @@
           <a:p>
             <a:fld id="{DFFE663C-AB41-468C-AA15-165177882E1A}" type="datetimeFigureOut">
               <a:rPr lang="en-GB" smtClean="0"/>
-              <a:t>24/06/2019</a:t>
+              <a:t>03/07/2019</a:t>
             </a:fld>
             <a:endParaRPr lang="en-GB"/>
           </a:p>
@@ -883,7 +883,7 @@
           <a:p>
             <a:fld id="{DFFE663C-AB41-468C-AA15-165177882E1A}" type="datetimeFigureOut">
               <a:rPr lang="en-GB" smtClean="0"/>
-              <a:t>24/06/2019</a:t>
+              <a:t>03/07/2019</a:t>
             </a:fld>
             <a:endParaRPr lang="en-GB"/>
           </a:p>
@@ -1159,7 +1159,7 @@
           <a:p>
             <a:fld id="{DFFE663C-AB41-468C-AA15-165177882E1A}" type="datetimeFigureOut">
               <a:rPr lang="en-GB" smtClean="0"/>
-              <a:t>24/06/2019</a:t>
+              <a:t>03/07/2019</a:t>
             </a:fld>
             <a:endParaRPr lang="en-GB"/>
           </a:p>
@@ -1427,7 +1427,7 @@
           <a:p>
             <a:fld id="{DFFE663C-AB41-468C-AA15-165177882E1A}" type="datetimeFigureOut">
               <a:rPr lang="en-GB" smtClean="0"/>
-              <a:t>24/06/2019</a:t>
+              <a:t>03/07/2019</a:t>
             </a:fld>
             <a:endParaRPr lang="en-GB"/>
           </a:p>
@@ -1842,7 +1842,7 @@
           <a:p>
             <a:fld id="{DFFE663C-AB41-468C-AA15-165177882E1A}" type="datetimeFigureOut">
               <a:rPr lang="en-GB" smtClean="0"/>
-              <a:t>24/06/2019</a:t>
+              <a:t>03/07/2019</a:t>
             </a:fld>
             <a:endParaRPr lang="en-GB"/>
           </a:p>
@@ -1984,7 +1984,7 @@
           <a:p>
             <a:fld id="{DFFE663C-AB41-468C-AA15-165177882E1A}" type="datetimeFigureOut">
               <a:rPr lang="en-GB" smtClean="0"/>
-              <a:t>24/06/2019</a:t>
+              <a:t>03/07/2019</a:t>
             </a:fld>
             <a:endParaRPr lang="en-GB"/>
           </a:p>
@@ -2097,7 +2097,7 @@
           <a:p>
             <a:fld id="{DFFE663C-AB41-468C-AA15-165177882E1A}" type="datetimeFigureOut">
               <a:rPr lang="en-GB" smtClean="0"/>
-              <a:t>24/06/2019</a:t>
+              <a:t>03/07/2019</a:t>
             </a:fld>
             <a:endParaRPr lang="en-GB"/>
           </a:p>
@@ -2410,7 +2410,7 @@
           <a:p>
             <a:fld id="{DFFE663C-AB41-468C-AA15-165177882E1A}" type="datetimeFigureOut">
               <a:rPr lang="en-GB" smtClean="0"/>
-              <a:t>24/06/2019</a:t>
+              <a:t>03/07/2019</a:t>
             </a:fld>
             <a:endParaRPr lang="en-GB"/>
           </a:p>
@@ -2699,7 +2699,7 @@
           <a:p>
             <a:fld id="{DFFE663C-AB41-468C-AA15-165177882E1A}" type="datetimeFigureOut">
               <a:rPr lang="en-GB" smtClean="0"/>
-              <a:t>24/06/2019</a:t>
+              <a:t>03/07/2019</a:t>
             </a:fld>
             <a:endParaRPr lang="en-GB"/>
           </a:p>
@@ -2942,7 +2942,7 @@
           <a:p>
             <a:fld id="{DFFE663C-AB41-468C-AA15-165177882E1A}" type="datetimeFigureOut">
               <a:rPr lang="en-GB" smtClean="0"/>
-              <a:t>24/06/2019</a:t>
+              <a:t>03/07/2019</a:t>
             </a:fld>
             <a:endParaRPr lang="en-GB"/>
           </a:p>
@@ -4562,7 +4562,7 @@
         </p:nvSpPr>
         <p:spPr>
           <a:xfrm>
-            <a:off x="567021" y="3728752"/>
+            <a:off x="271848" y="3089070"/>
             <a:ext cx="1918446" cy="307777"/>
           </a:xfrm>
           <a:prstGeom prst="rect">
@@ -4881,7 +4881,7 @@
         </p:nvSpPr>
         <p:spPr>
           <a:xfrm>
-            <a:off x="748563" y="4569262"/>
+            <a:off x="453390" y="3929580"/>
             <a:ext cx="1662953" cy="523220"/>
           </a:xfrm>
           <a:prstGeom prst="rect">
@@ -5039,7 +5039,7 @@
         </p:nvSpPr>
         <p:spPr>
           <a:xfrm>
-            <a:off x="782178" y="1943415"/>
+            <a:off x="487005" y="1303733"/>
             <a:ext cx="1488137" cy="307777"/>
           </a:xfrm>
           <a:prstGeom prst="rect">
@@ -5079,7 +5079,7 @@
         </p:nvSpPr>
         <p:spPr>
           <a:xfrm>
-            <a:off x="672359" y="857118"/>
+            <a:off x="377186" y="217436"/>
             <a:ext cx="1757083" cy="523220"/>
           </a:xfrm>
           <a:prstGeom prst="rect">
@@ -5114,7 +5114,7 @@
         </p:nvSpPr>
         <p:spPr>
           <a:xfrm>
-            <a:off x="466176" y="2698065"/>
+            <a:off x="171003" y="2058383"/>
             <a:ext cx="2227729" cy="523220"/>
           </a:xfrm>
           <a:prstGeom prst="rect">
@@ -5556,7 +5556,7 @@
         </p:nvSpPr>
         <p:spPr>
           <a:xfrm>
-            <a:off x="1358157" y="1389516"/>
+            <a:off x="1062984" y="749834"/>
             <a:ext cx="239509" cy="523220"/>
           </a:xfrm>
           <a:prstGeom prst="downArrow">
@@ -5602,7 +5602,7 @@
         </p:nvSpPr>
         <p:spPr>
           <a:xfrm>
-            <a:off x="1358156" y="2266922"/>
+            <a:off x="1062983" y="1627240"/>
             <a:ext cx="221885" cy="523220"/>
           </a:xfrm>
           <a:prstGeom prst="downArrow">
@@ -5647,9 +5647,9 @@
           <p:nvPr/>
         </p:nvSpPr>
         <p:spPr>
-          <a:xfrm rot="3558484">
-            <a:off x="2712831" y="663707"/>
-            <a:ext cx="217427" cy="1601744"/>
+          <a:xfrm rot="4649665">
+            <a:off x="2599082" y="531386"/>
+            <a:ext cx="253684" cy="1444054"/>
           </a:xfrm>
           <a:prstGeom prst="downArrow">
             <a:avLst/>
@@ -5693,9 +5693,9 @@
           <p:nvPr/>
         </p:nvSpPr>
         <p:spPr>
-          <a:xfrm rot="1709614">
-            <a:off x="2801023" y="1110561"/>
-            <a:ext cx="217427" cy="2605082"/>
+          <a:xfrm rot="2364550">
+            <a:off x="2662705" y="1030525"/>
+            <a:ext cx="271981" cy="2257187"/>
           </a:xfrm>
           <a:prstGeom prst="downArrow">
             <a:avLst/>
@@ -5740,7 +5740,7 @@
         </p:nvSpPr>
         <p:spPr>
           <a:xfrm>
-            <a:off x="1358157" y="3175119"/>
+            <a:off x="1062984" y="2535437"/>
             <a:ext cx="239510" cy="523220"/>
           </a:xfrm>
           <a:prstGeom prst="downArrow">
@@ -5786,7 +5786,7 @@
         </p:nvSpPr>
         <p:spPr>
           <a:xfrm>
-            <a:off x="1358155" y="4066942"/>
+            <a:off x="1062982" y="3427260"/>
             <a:ext cx="239511" cy="523220"/>
           </a:xfrm>
           <a:prstGeom prst="downArrow">
@@ -5832,8 +5832,8 @@
         </p:nvSpPr>
         <p:spPr>
           <a:xfrm rot="17501080">
-            <a:off x="2955521" y="4283125"/>
-            <a:ext cx="164695" cy="1586527"/>
+            <a:off x="2652223" y="3836124"/>
+            <a:ext cx="291334" cy="2153395"/>
           </a:xfrm>
           <a:prstGeom prst="downArrow">
             <a:avLst/>
@@ -6309,6 +6309,52 @@
             <a:ext cx="271016" cy="376621"/>
           </a:xfrm>
           <a:prstGeom prst="downArrow">
+            <a:avLst/>
+          </a:prstGeom>
+        </p:spPr>
+        <p:style>
+          <a:lnRef idx="2">
+            <a:schemeClr val="accent1">
+              <a:shade val="50000"/>
+            </a:schemeClr>
+          </a:lnRef>
+          <a:fillRef idx="1">
+            <a:schemeClr val="accent1"/>
+          </a:fillRef>
+          <a:effectRef idx="0">
+            <a:schemeClr val="accent1"/>
+          </a:effectRef>
+          <a:fontRef idx="minor">
+            <a:schemeClr val="lt1"/>
+          </a:fontRef>
+        </p:style>
+        <p:txBody>
+          <a:bodyPr rtlCol="0" anchor="ctr"/>
+          <a:lstStyle/>
+          <a:p>
+            <a:pPr algn="ctr"/>
+            <a:endParaRPr lang="en-GB"/>
+          </a:p>
+        </p:txBody>
+      </p:sp>
+      <p:sp>
+        <p:nvSpPr>
+          <p:cNvPr id="3" name="Arrow: Right 2">
+            <a:extLst>
+              <a:ext uri="{FF2B5EF4-FFF2-40B4-BE49-F238E27FC236}">
+                <a16:creationId xmlns:a16="http://schemas.microsoft.com/office/drawing/2014/main" id="{5F941C98-00A0-4598-9C13-866C8F3CE616}"/>
+              </a:ext>
+            </a:extLst>
+          </p:cNvPr>
+          <p:cNvSpPr/>
+          <p:nvPr/>
+        </p:nvSpPr>
+        <p:spPr>
+          <a:xfrm rot="20856261">
+            <a:off x="2205262" y="2126893"/>
+            <a:ext cx="1152420" cy="260782"/>
+          </a:xfrm>
+          <a:prstGeom prst="rightArrow">
             <a:avLst/>
           </a:prstGeom>
         </p:spPr>

</xml_diff>